<commit_message>
chmod +x *.py *.sh
</commit_message>
<xml_diff>
--- a/Pez2015.pptx
+++ b/Pez2015.pptx
@@ -215,7 +215,7 @@
           <a:effectLst/>
           <a:extLst>
             <a:ext uri="{91240B29-F687-4f45-9708-019B960494DF}">
-              <a14:hiddenLine xmlns="" xmlns:a14="http://schemas.microsoft.com/office/drawing/2010/main" w="9525">
+              <a14:hiddenLine xmlns:a14="http://schemas.microsoft.com/office/drawing/2010/main" xmlns="" w="9525">
                 <a:solidFill>
                   <a:srgbClr val="000000"/>
                 </a:solidFill>
@@ -1725,7 +1725,7 @@
           <a:ln/>
           <a:extLst>
             <a:ext uri="{91240B29-F687-4f45-9708-019B960494DF}">
-              <a14:hiddenLine xmlns="" xmlns:a14="http://schemas.microsoft.com/office/drawing/2010/main" w="9525">
+              <a14:hiddenLine xmlns:a14="http://schemas.microsoft.com/office/drawing/2010/main" xmlns="" w="9525">
                 <a:solidFill>
                   <a:srgbClr val="000000"/>
                 </a:solidFill>
@@ -1997,7 +1997,7 @@
           <a:ln/>
           <a:extLst>
             <a:ext uri="{91240B29-F687-4f45-9708-019B960494DF}">
-              <a14:hiddenLine xmlns="" xmlns:a14="http://schemas.microsoft.com/office/drawing/2010/main" w="9525">
+              <a14:hiddenLine xmlns:a14="http://schemas.microsoft.com/office/drawing/2010/main" xmlns="" w="9525">
                 <a:solidFill>
                   <a:srgbClr val="000000"/>
                 </a:solidFill>
@@ -2277,7 +2277,7 @@
           <a:ln/>
           <a:extLst>
             <a:ext uri="{91240B29-F687-4f45-9708-019B960494DF}">
-              <a14:hiddenLine xmlns="" xmlns:a14="http://schemas.microsoft.com/office/drawing/2010/main" w="9525">
+              <a14:hiddenLine xmlns:a14="http://schemas.microsoft.com/office/drawing/2010/main" xmlns="" w="9525">
                 <a:solidFill>
                   <a:srgbClr val="000000"/>
                 </a:solidFill>
@@ -2897,7 +2897,7 @@
           <a:ln/>
           <a:extLst>
             <a:ext uri="{91240B29-F687-4f45-9708-019B960494DF}">
-              <a14:hiddenLine xmlns="" xmlns:a14="http://schemas.microsoft.com/office/drawing/2010/main" w="9525">
+              <a14:hiddenLine xmlns:a14="http://schemas.microsoft.com/office/drawing/2010/main" xmlns="" w="9525">
                 <a:solidFill>
                   <a:srgbClr val="000000"/>
                 </a:solidFill>
@@ -3233,7 +3233,7 @@
           <a:ln/>
           <a:extLst>
             <a:ext uri="{91240B29-F687-4f45-9708-019B960494DF}">
-              <a14:hiddenLine xmlns="" xmlns:a14="http://schemas.microsoft.com/office/drawing/2010/main" w="9525">
+              <a14:hiddenLine xmlns:a14="http://schemas.microsoft.com/office/drawing/2010/main" xmlns="" w="9525">
                 <a:solidFill>
                   <a:srgbClr val="000000"/>
                 </a:solidFill>
@@ -3707,7 +3707,7 @@
           <a:ln/>
           <a:extLst>
             <a:ext uri="{91240B29-F687-4f45-9708-019B960494DF}">
-              <a14:hiddenLine xmlns="" xmlns:a14="http://schemas.microsoft.com/office/drawing/2010/main" w="9525">
+              <a14:hiddenLine xmlns:a14="http://schemas.microsoft.com/office/drawing/2010/main" xmlns="" w="9525">
                 <a:solidFill>
                   <a:srgbClr val="000000"/>
                 </a:solidFill>
@@ -4130,7 +4130,7 @@
           <a:ln/>
           <a:extLst>
             <a:ext uri="{91240B29-F687-4f45-9708-019B960494DF}">
-              <a14:hiddenLine xmlns="" xmlns:a14="http://schemas.microsoft.com/office/drawing/2010/main" w="9525">
+              <a14:hiddenLine xmlns:a14="http://schemas.microsoft.com/office/drawing/2010/main" xmlns="" w="9525">
                 <a:solidFill>
                   <a:srgbClr val="000000"/>
                 </a:solidFill>
@@ -5370,11 +5370,7 @@
           <a:p>
             <a:r>
               <a:rPr lang="el-GR" smtClean="0"/>
-              <a:t>ΙΑΤΡΙΚΕΣ ΒΑΣΕΙΣ </a:t>
-            </a:r>
-            <a:r>
-              <a:rPr lang="el-GR" smtClean="0"/>
-              <a:t>ΔΕΔΟΜΕΝΩΝ</a:t>
+              <a:t>ΙΑΤΡΙΚΕΣ ΒΑΣΕΙΣ ΔΕΔΟΜΕΝΩΝ</a:t>
             </a:r>
             <a:endParaRPr lang="en-US" dirty="0"/>
           </a:p>
@@ -5413,6 +5409,13 @@
   <p:clrMapOvr>
     <a:masterClrMapping/>
   </p:clrMapOvr>
+  <p:timing>
+    <p:tnLst>
+      <p:par>
+        <p:cTn id="1" dur="indefinite" restart="never" nodeType="tmRoot"/>
+      </p:par>
+    </p:tnLst>
+  </p:timing>
 </p:sld>
 </file>
 
@@ -5509,6 +5512,13 @@
   <p:clrMapOvr>
     <a:masterClrMapping/>
   </p:clrMapOvr>
+  <p:timing>
+    <p:tnLst>
+      <p:par>
+        <p:cTn id="1" dur="indefinite" restart="never" nodeType="tmRoot"/>
+      </p:par>
+    </p:tnLst>
+  </p:timing>
 </p:sld>
 </file>
 
@@ -5717,6 +5727,13 @@
   <p:clrMapOvr>
     <a:masterClrMapping/>
   </p:clrMapOvr>
+  <p:timing>
+    <p:tnLst>
+      <p:par>
+        <p:cTn id="1" dur="indefinite" restart="never" nodeType="tmRoot"/>
+      </p:par>
+    </p:tnLst>
+  </p:timing>
 </p:sld>
 </file>
 
@@ -5987,6 +6004,13 @@
   <p:clrMapOvr>
     <a:masterClrMapping/>
   </p:clrMapOvr>
+  <p:timing>
+    <p:tnLst>
+      <p:par>
+        <p:cTn id="1" dur="indefinite" restart="never" nodeType="tmRoot"/>
+      </p:par>
+    </p:tnLst>
+  </p:timing>
 </p:sld>
 </file>
 

</xml_diff>